<commit_message>
Added github urls to the presentation
</commit_message>
<xml_diff>
--- a/presentatie.pptx
+++ b/presentatie.pptx
@@ -12189,6 +12189,206 @@
           </a:p>
         </p:txBody>
       </p:sp>
+      <p:sp>
+        <p:nvSpPr>
+          <p:cNvPr id="3" name="Ondertitel 1">
+            <a:extLst>
+              <a:ext uri="{FF2B5EF4-FFF2-40B4-BE49-F238E27FC236}">
+                <a16:creationId xmlns:a16="http://schemas.microsoft.com/office/drawing/2014/main" id="{7FEF9C6B-0215-48FC-841A-6A7B6632B38C}"/>
+              </a:ext>
+            </a:extLst>
+          </p:cNvPr>
+          <p:cNvSpPr txBox="1">
+            <a:spLocks/>
+          </p:cNvSpPr>
+          <p:nvPr/>
+        </p:nvSpPr>
+        <p:spPr>
+          <a:xfrm>
+            <a:off x="4631377" y="5961413"/>
+            <a:ext cx="6968395" cy="475302"/>
+          </a:xfrm>
+          <a:prstGeom prst="rect">
+            <a:avLst/>
+          </a:prstGeom>
+        </p:spPr>
+        <p:txBody>
+          <a:bodyPr vert="horz" lIns="91440" tIns="45720" rIns="91440" bIns="45720" rtlCol="0">
+            <a:noAutofit/>
+          </a:bodyPr>
+          <a:lstStyle>
+            <a:lvl1pPr marL="0" indent="0" algn="l" defTabSz="914400" rtl="0" eaLnBrk="1" latinLnBrk="0" hangingPunct="1">
+              <a:lnSpc>
+                <a:spcPct val="90000"/>
+              </a:lnSpc>
+              <a:spcBef>
+                <a:spcPts val="1000"/>
+              </a:spcBef>
+              <a:buFont typeface="Arial"/>
+              <a:buNone/>
+              <a:defRPr lang="en-US" sz="2800" b="0" i="0" kern="1200" dirty="0">
+                <a:solidFill>
+                  <a:schemeClr val="bg1"/>
+                </a:solidFill>
+                <a:latin typeface="Segoe UI Light" charset="0"/>
+                <a:ea typeface="Segoe UI Light" charset="0"/>
+                <a:cs typeface="Segoe UI Light" charset="0"/>
+              </a:defRPr>
+            </a:lvl1pPr>
+            <a:lvl2pPr marL="457200" indent="0" algn="ctr" defTabSz="914400" rtl="0" eaLnBrk="1" latinLnBrk="0" hangingPunct="1">
+              <a:lnSpc>
+                <a:spcPct val="90000"/>
+              </a:lnSpc>
+              <a:spcBef>
+                <a:spcPts val="500"/>
+              </a:spcBef>
+              <a:buFont typeface="Arial"/>
+              <a:buNone/>
+              <a:defRPr sz="2000" b="0" i="0" kern="1200">
+                <a:solidFill>
+                  <a:schemeClr val="tx1"/>
+                </a:solidFill>
+                <a:latin typeface="Segoe UI Light" charset="0"/>
+                <a:ea typeface="Segoe UI Light" charset="0"/>
+                <a:cs typeface="Segoe UI Light" charset="0"/>
+              </a:defRPr>
+            </a:lvl2pPr>
+            <a:lvl3pPr marL="914400" indent="0" algn="ctr" defTabSz="914400" rtl="0" eaLnBrk="1" latinLnBrk="0" hangingPunct="1">
+              <a:lnSpc>
+                <a:spcPct val="90000"/>
+              </a:lnSpc>
+              <a:spcBef>
+                <a:spcPts val="500"/>
+              </a:spcBef>
+              <a:buFont typeface="Arial"/>
+              <a:buNone/>
+              <a:defRPr sz="1800" b="0" i="0" kern="1200">
+                <a:solidFill>
+                  <a:schemeClr val="tx1"/>
+                </a:solidFill>
+                <a:latin typeface="Segoe UI Light" charset="0"/>
+                <a:ea typeface="Segoe UI Light" charset="0"/>
+                <a:cs typeface="Segoe UI Light" charset="0"/>
+              </a:defRPr>
+            </a:lvl3pPr>
+            <a:lvl4pPr marL="1371600" indent="0" algn="ctr" defTabSz="914400" rtl="0" eaLnBrk="1" latinLnBrk="0" hangingPunct="1">
+              <a:lnSpc>
+                <a:spcPct val="90000"/>
+              </a:lnSpc>
+              <a:spcBef>
+                <a:spcPts val="500"/>
+              </a:spcBef>
+              <a:buFont typeface="Arial"/>
+              <a:buNone/>
+              <a:defRPr sz="1600" b="0" i="0" kern="1200">
+                <a:solidFill>
+                  <a:schemeClr val="tx1"/>
+                </a:solidFill>
+                <a:latin typeface="Segoe UI Light" charset="0"/>
+                <a:ea typeface="Segoe UI Light" charset="0"/>
+                <a:cs typeface="Segoe UI Light" charset="0"/>
+              </a:defRPr>
+            </a:lvl4pPr>
+            <a:lvl5pPr marL="1828800" indent="0" algn="ctr" defTabSz="914400" rtl="0" eaLnBrk="1" latinLnBrk="0" hangingPunct="1">
+              <a:lnSpc>
+                <a:spcPct val="90000"/>
+              </a:lnSpc>
+              <a:spcBef>
+                <a:spcPts val="500"/>
+              </a:spcBef>
+              <a:buFont typeface="Arial"/>
+              <a:buNone/>
+              <a:defRPr sz="1600" b="0" i="0" kern="1200">
+                <a:solidFill>
+                  <a:schemeClr val="tx1"/>
+                </a:solidFill>
+                <a:latin typeface="Segoe UI Light" charset="0"/>
+                <a:ea typeface="Segoe UI Light" charset="0"/>
+                <a:cs typeface="Segoe UI Light" charset="0"/>
+              </a:defRPr>
+            </a:lvl5pPr>
+            <a:lvl6pPr marL="2286000" indent="0" algn="ctr" defTabSz="914400" rtl="0" eaLnBrk="1" latinLnBrk="0" hangingPunct="1">
+              <a:lnSpc>
+                <a:spcPct val="90000"/>
+              </a:lnSpc>
+              <a:spcBef>
+                <a:spcPts val="500"/>
+              </a:spcBef>
+              <a:buFont typeface="Arial"/>
+              <a:buNone/>
+              <a:defRPr sz="1600" kern="1200">
+                <a:solidFill>
+                  <a:schemeClr val="tx1"/>
+                </a:solidFill>
+                <a:latin typeface="+mn-lt"/>
+                <a:ea typeface="+mn-ea"/>
+                <a:cs typeface="+mn-cs"/>
+              </a:defRPr>
+            </a:lvl6pPr>
+            <a:lvl7pPr marL="2743200" indent="0" algn="ctr" defTabSz="914400" rtl="0" eaLnBrk="1" latinLnBrk="0" hangingPunct="1">
+              <a:lnSpc>
+                <a:spcPct val="90000"/>
+              </a:lnSpc>
+              <a:spcBef>
+                <a:spcPts val="500"/>
+              </a:spcBef>
+              <a:buFont typeface="Arial"/>
+              <a:buNone/>
+              <a:defRPr sz="1600" kern="1200">
+                <a:solidFill>
+                  <a:schemeClr val="tx1"/>
+                </a:solidFill>
+                <a:latin typeface="+mn-lt"/>
+                <a:ea typeface="+mn-ea"/>
+                <a:cs typeface="+mn-cs"/>
+              </a:defRPr>
+            </a:lvl7pPr>
+            <a:lvl8pPr marL="3200400" indent="0" algn="ctr" defTabSz="914400" rtl="0" eaLnBrk="1" latinLnBrk="0" hangingPunct="1">
+              <a:lnSpc>
+                <a:spcPct val="90000"/>
+              </a:lnSpc>
+              <a:spcBef>
+                <a:spcPts val="500"/>
+              </a:spcBef>
+              <a:buFont typeface="Arial"/>
+              <a:buNone/>
+              <a:defRPr sz="1600" kern="1200">
+                <a:solidFill>
+                  <a:schemeClr val="tx1"/>
+                </a:solidFill>
+                <a:latin typeface="+mn-lt"/>
+                <a:ea typeface="+mn-ea"/>
+                <a:cs typeface="+mn-cs"/>
+              </a:defRPr>
+            </a:lvl8pPr>
+            <a:lvl9pPr marL="3657600" indent="0" algn="ctr" defTabSz="914400" rtl="0" eaLnBrk="1" latinLnBrk="0" hangingPunct="1">
+              <a:lnSpc>
+                <a:spcPct val="90000"/>
+              </a:lnSpc>
+              <a:spcBef>
+                <a:spcPts val="500"/>
+              </a:spcBef>
+              <a:buFont typeface="Arial"/>
+              <a:buNone/>
+              <a:defRPr sz="1600" kern="1200">
+                <a:solidFill>
+                  <a:schemeClr val="tx1"/>
+                </a:solidFill>
+                <a:latin typeface="+mn-lt"/>
+                <a:ea typeface="+mn-ea"/>
+                <a:cs typeface="+mn-cs"/>
+              </a:defRPr>
+            </a:lvl9pPr>
+          </a:lstStyle>
+          <a:p>
+            <a:pPr algn="r"/>
+            <a:r>
+              <a:rPr lang="nl-NL" sz="2000" dirty="0"/>
+              <a:t>https://github.com/andregeuze/sdfg-2017</a:t>
+            </a:r>
+          </a:p>
+        </p:txBody>
+      </p:sp>
     </p:spTree>
     <p:extLst>
       <p:ext uri="{BB962C8B-B14F-4D97-AF65-F5344CB8AC3E}">
@@ -12309,6 +12509,205 @@
               <a:t>met Docker Compose</a:t>
             </a:r>
             <a:endParaRPr lang="nl-NL" dirty="0"/>
+          </a:p>
+        </p:txBody>
+      </p:sp>
+      <p:sp>
+        <p:nvSpPr>
+          <p:cNvPr id="4" name="Ondertitel 1">
+            <a:extLst>
+              <a:ext uri="{FF2B5EF4-FFF2-40B4-BE49-F238E27FC236}">
+                <a16:creationId xmlns:a16="http://schemas.microsoft.com/office/drawing/2014/main" id="{3EE1A038-2855-4844-9C72-66C9B90B804F}"/>
+              </a:ext>
+            </a:extLst>
+          </p:cNvPr>
+          <p:cNvSpPr txBox="1">
+            <a:spLocks/>
+          </p:cNvSpPr>
+          <p:nvPr/>
+        </p:nvSpPr>
+        <p:spPr>
+          <a:xfrm>
+            <a:off x="1074875" y="5343896"/>
+            <a:ext cx="10524898" cy="1092819"/>
+          </a:xfrm>
+          <a:prstGeom prst="rect">
+            <a:avLst/>
+          </a:prstGeom>
+        </p:spPr>
+        <p:txBody>
+          <a:bodyPr vert="horz" lIns="91440" tIns="45720" rIns="91440" bIns="45720" rtlCol="0">
+            <a:noAutofit/>
+          </a:bodyPr>
+          <a:lstStyle>
+            <a:lvl1pPr marL="0" indent="0" algn="l" defTabSz="914400" rtl="0" eaLnBrk="1" latinLnBrk="0" hangingPunct="1">
+              <a:lnSpc>
+                <a:spcPct val="90000"/>
+              </a:lnSpc>
+              <a:spcBef>
+                <a:spcPts val="1000"/>
+              </a:spcBef>
+              <a:buFont typeface="Arial"/>
+              <a:buNone/>
+              <a:defRPr lang="en-US" sz="2800" b="0" i="0" kern="1200" dirty="0">
+                <a:solidFill>
+                  <a:schemeClr val="bg1"/>
+                </a:solidFill>
+                <a:latin typeface="Segoe UI Light" charset="0"/>
+                <a:ea typeface="Segoe UI Light" charset="0"/>
+                <a:cs typeface="Segoe UI Light" charset="0"/>
+              </a:defRPr>
+            </a:lvl1pPr>
+            <a:lvl2pPr marL="457200" indent="0" algn="ctr" defTabSz="914400" rtl="0" eaLnBrk="1" latinLnBrk="0" hangingPunct="1">
+              <a:lnSpc>
+                <a:spcPct val="90000"/>
+              </a:lnSpc>
+              <a:spcBef>
+                <a:spcPts val="500"/>
+              </a:spcBef>
+              <a:buFont typeface="Arial"/>
+              <a:buNone/>
+              <a:defRPr sz="2000" b="0" i="0" kern="1200">
+                <a:solidFill>
+                  <a:schemeClr val="tx1"/>
+                </a:solidFill>
+                <a:latin typeface="Segoe UI Light" charset="0"/>
+                <a:ea typeface="Segoe UI Light" charset="0"/>
+                <a:cs typeface="Segoe UI Light" charset="0"/>
+              </a:defRPr>
+            </a:lvl2pPr>
+            <a:lvl3pPr marL="914400" indent="0" algn="ctr" defTabSz="914400" rtl="0" eaLnBrk="1" latinLnBrk="0" hangingPunct="1">
+              <a:lnSpc>
+                <a:spcPct val="90000"/>
+              </a:lnSpc>
+              <a:spcBef>
+                <a:spcPts val="500"/>
+              </a:spcBef>
+              <a:buFont typeface="Arial"/>
+              <a:buNone/>
+              <a:defRPr sz="1800" b="0" i="0" kern="1200">
+                <a:solidFill>
+                  <a:schemeClr val="tx1"/>
+                </a:solidFill>
+                <a:latin typeface="Segoe UI Light" charset="0"/>
+                <a:ea typeface="Segoe UI Light" charset="0"/>
+                <a:cs typeface="Segoe UI Light" charset="0"/>
+              </a:defRPr>
+            </a:lvl3pPr>
+            <a:lvl4pPr marL="1371600" indent="0" algn="ctr" defTabSz="914400" rtl="0" eaLnBrk="1" latinLnBrk="0" hangingPunct="1">
+              <a:lnSpc>
+                <a:spcPct val="90000"/>
+              </a:lnSpc>
+              <a:spcBef>
+                <a:spcPts val="500"/>
+              </a:spcBef>
+              <a:buFont typeface="Arial"/>
+              <a:buNone/>
+              <a:defRPr sz="1600" b="0" i="0" kern="1200">
+                <a:solidFill>
+                  <a:schemeClr val="tx1"/>
+                </a:solidFill>
+                <a:latin typeface="Segoe UI Light" charset="0"/>
+                <a:ea typeface="Segoe UI Light" charset="0"/>
+                <a:cs typeface="Segoe UI Light" charset="0"/>
+              </a:defRPr>
+            </a:lvl4pPr>
+            <a:lvl5pPr marL="1828800" indent="0" algn="ctr" defTabSz="914400" rtl="0" eaLnBrk="1" latinLnBrk="0" hangingPunct="1">
+              <a:lnSpc>
+                <a:spcPct val="90000"/>
+              </a:lnSpc>
+              <a:spcBef>
+                <a:spcPts val="500"/>
+              </a:spcBef>
+              <a:buFont typeface="Arial"/>
+              <a:buNone/>
+              <a:defRPr sz="1600" b="0" i="0" kern="1200">
+                <a:solidFill>
+                  <a:schemeClr val="tx1"/>
+                </a:solidFill>
+                <a:latin typeface="Segoe UI Light" charset="0"/>
+                <a:ea typeface="Segoe UI Light" charset="0"/>
+                <a:cs typeface="Segoe UI Light" charset="0"/>
+              </a:defRPr>
+            </a:lvl5pPr>
+            <a:lvl6pPr marL="2286000" indent="0" algn="ctr" defTabSz="914400" rtl="0" eaLnBrk="1" latinLnBrk="0" hangingPunct="1">
+              <a:lnSpc>
+                <a:spcPct val="90000"/>
+              </a:lnSpc>
+              <a:spcBef>
+                <a:spcPts val="500"/>
+              </a:spcBef>
+              <a:buFont typeface="Arial"/>
+              <a:buNone/>
+              <a:defRPr sz="1600" kern="1200">
+                <a:solidFill>
+                  <a:schemeClr val="tx1"/>
+                </a:solidFill>
+                <a:latin typeface="+mn-lt"/>
+                <a:ea typeface="+mn-ea"/>
+                <a:cs typeface="+mn-cs"/>
+              </a:defRPr>
+            </a:lvl6pPr>
+            <a:lvl7pPr marL="2743200" indent="0" algn="ctr" defTabSz="914400" rtl="0" eaLnBrk="1" latinLnBrk="0" hangingPunct="1">
+              <a:lnSpc>
+                <a:spcPct val="90000"/>
+              </a:lnSpc>
+              <a:spcBef>
+                <a:spcPts val="500"/>
+              </a:spcBef>
+              <a:buFont typeface="Arial"/>
+              <a:buNone/>
+              <a:defRPr sz="1600" kern="1200">
+                <a:solidFill>
+                  <a:schemeClr val="tx1"/>
+                </a:solidFill>
+                <a:latin typeface="+mn-lt"/>
+                <a:ea typeface="+mn-ea"/>
+                <a:cs typeface="+mn-cs"/>
+              </a:defRPr>
+            </a:lvl7pPr>
+            <a:lvl8pPr marL="3200400" indent="0" algn="ctr" defTabSz="914400" rtl="0" eaLnBrk="1" latinLnBrk="0" hangingPunct="1">
+              <a:lnSpc>
+                <a:spcPct val="90000"/>
+              </a:lnSpc>
+              <a:spcBef>
+                <a:spcPts val="500"/>
+              </a:spcBef>
+              <a:buFont typeface="Arial"/>
+              <a:buNone/>
+              <a:defRPr sz="1600" kern="1200">
+                <a:solidFill>
+                  <a:schemeClr val="tx1"/>
+                </a:solidFill>
+                <a:latin typeface="+mn-lt"/>
+                <a:ea typeface="+mn-ea"/>
+                <a:cs typeface="+mn-cs"/>
+              </a:defRPr>
+            </a:lvl8pPr>
+            <a:lvl9pPr marL="3657600" indent="0" algn="ctr" defTabSz="914400" rtl="0" eaLnBrk="1" latinLnBrk="0" hangingPunct="1">
+              <a:lnSpc>
+                <a:spcPct val="90000"/>
+              </a:lnSpc>
+              <a:spcBef>
+                <a:spcPts val="500"/>
+              </a:spcBef>
+              <a:buFont typeface="Arial"/>
+              <a:buNone/>
+              <a:defRPr sz="1600" kern="1200">
+                <a:solidFill>
+                  <a:schemeClr val="tx1"/>
+                </a:solidFill>
+                <a:latin typeface="+mn-lt"/>
+                <a:ea typeface="+mn-ea"/>
+                <a:cs typeface="+mn-cs"/>
+              </a:defRPr>
+            </a:lvl9pPr>
+          </a:lstStyle>
+          <a:p>
+            <a:r>
+              <a:rPr lang="nl-NL" dirty="0"/>
+              <a:t>https://github.com/andregeuze/sdfg-2017</a:t>
+            </a:r>
           </a:p>
         </p:txBody>
       </p:sp>

</xml_diff>